<commit_message>
Change to last slide
</commit_message>
<xml_diff>
--- a/slides/final_presentation_draft/bins_v3.pptx
+++ b/slides/final_presentation_draft/bins_v3.pptx
@@ -7900,8 +7900,8 @@
           </a:p>
         </p:txBody>
       </p:sp>
-      <mc:AlternateContent xmlns:mc="http://schemas.openxmlformats.org/markup-compatibility/2006">
-        <mc:Choice xmlns:a14="http://schemas.microsoft.com/office/drawing/2010/main" Requires="a14">
+      <mc:AlternateContent xmlns:mc="http://schemas.openxmlformats.org/markup-compatibility/2006" xmlns:a14="http://schemas.microsoft.com/office/drawing/2010/main">
+        <mc:Choice Requires="a14">
           <p:sp>
             <p:nvSpPr>
               <p:cNvPr id="5" name="Content Placeholder 4">
@@ -8213,7 +8213,7 @@
             </p:txBody>
           </p:sp>
         </mc:Choice>
-        <mc:Fallback>
+        <mc:Fallback xmlns="">
           <p:sp>
             <p:nvSpPr>
               <p:cNvPr id="5" name="Content Placeholder 4">
@@ -8349,20 +8349,20 @@
           <a:p>
             <a:r>
               <a:rPr lang="en-US" dirty="0"/>
-              <a:t>Year prediction</a:t>
-            </a:r>
+              <a:t>Time period </a:t>
+            </a:r>
+            <a:r>
+              <a:rPr lang="en-US"/>
+              <a:t>Predition</a:t>
+            </a:r>
+            <a:endParaRPr lang="en-US" dirty="0"/>
           </a:p>
           <a:p>
             <a:pPr lvl="1"/>
             <a:r>
               <a:rPr lang="en-US" dirty="0"/>
-              <a:t>Text-based + link-base </a:t>
-            </a:r>
-            <a:r>
-              <a:rPr lang="en-US"/>
-              <a:t>works better</a:t>
-            </a:r>
-            <a:endParaRPr lang="en-US" dirty="0"/>
+              <a:t>Text-based + link-base works better</a:t>
+            </a:r>
           </a:p>
           <a:p>
             <a:pPr lvl="1"/>

</xml_diff>